<commit_message>
First verion of Overall CI Arch
</commit_message>
<xml_diff>
--- a/Overall_Arch.pptx
+++ b/Overall_Arch.pptx
@@ -4,6 +4,9 @@
   <p:sldMasterIdLst>
     <p:sldMasterId id="2147483648" r:id="rId1"/>
   </p:sldMasterIdLst>
+  <p:handoutMasterIdLst>
+    <p:handoutMasterId r:id="rId4"/>
+  </p:handoutMasterIdLst>
   <p:sldIdLst>
     <p:sldId id="256" r:id="rId2"/>
     <p:sldId id="257" r:id="rId3"/>
@@ -106,6 +109,195 @@
     </a:lvl9pPr>
   </p:defaultTextStyle>
 </p:presentation>
+</file>
+
+<file path=ppt/handoutMasters/handoutMaster1.xml><?xml version="1.0" encoding="utf-8"?>
+<p:handoutMaster xmlns:a="http://schemas.openxmlformats.org/drawingml/2006/main" xmlns:r="http://schemas.openxmlformats.org/officeDocument/2006/relationships" xmlns:p="http://schemas.openxmlformats.org/presentationml/2006/main">
+  <p:cSld>
+    <p:bg>
+      <p:bgRef idx="1001">
+        <a:schemeClr val="bg1"/>
+      </p:bgRef>
+    </p:bg>
+    <p:spTree>
+      <p:nvGrpSpPr>
+        <p:cNvPr id="1" name=""/>
+        <p:cNvGrpSpPr/>
+        <p:nvPr/>
+      </p:nvGrpSpPr>
+      <p:grpSpPr>
+        <a:xfrm>
+          <a:off x="0" y="0"/>
+          <a:ext cx="0" cy="0"/>
+          <a:chOff x="0" y="0"/>
+          <a:chExt cx="0" cy="0"/>
+        </a:xfrm>
+      </p:grpSpPr>
+      <p:sp>
+        <p:nvSpPr>
+          <p:cNvPr id="2" name="Header Placeholder 1">
+            <a:extLst>
+              <a:ext uri="{FF2B5EF4-FFF2-40B4-BE49-F238E27FC236}">
+                <a16:creationId xmlns:a16="http://schemas.microsoft.com/office/drawing/2014/main" id="{E4D579A5-C766-C65F-0E5E-766590299707}"/>
+              </a:ext>
+            </a:extLst>
+          </p:cNvPr>
+          <p:cNvSpPr>
+            <a:spLocks noGrp="1"/>
+          </p:cNvSpPr>
+          <p:nvPr>
+            <p:ph type="hdr" sz="quarter"/>
+          </p:nvPr>
+        </p:nvSpPr>
+        <p:spPr>
+          <a:xfrm>
+            <a:off x="0" y="0"/>
+            <a:ext cx="2971800" cy="458788"/>
+          </a:xfrm>
+          <a:prstGeom prst="rect">
+            <a:avLst/>
+          </a:prstGeom>
+        </p:spPr>
+        <p:txBody>
+          <a:bodyPr vert="horz" lIns="91440" tIns="45720" rIns="91440" bIns="45720" rtlCol="0"/>
+          <a:lstStyle>
+            <a:lvl1pPr algn="l">
+              <a:defRPr sz="1200"/>
+            </a:lvl1pPr>
+          </a:lstStyle>
+          <a:p>
+            <a:endParaRPr lang="en-US"/>
+          </a:p>
+        </p:txBody>
+      </p:sp>
+      <p:sp>
+        <p:nvSpPr>
+          <p:cNvPr id="3" name="Date Placeholder 2">
+            <a:extLst>
+              <a:ext uri="{FF2B5EF4-FFF2-40B4-BE49-F238E27FC236}">
+                <a16:creationId xmlns:a16="http://schemas.microsoft.com/office/drawing/2014/main" id="{D65D19FB-097A-7FEE-430D-39DCC400880D}"/>
+              </a:ext>
+            </a:extLst>
+          </p:cNvPr>
+          <p:cNvSpPr>
+            <a:spLocks noGrp="1"/>
+          </p:cNvSpPr>
+          <p:nvPr>
+            <p:ph type="dt" sz="quarter" idx="1"/>
+          </p:nvPr>
+        </p:nvSpPr>
+        <p:spPr>
+          <a:xfrm>
+            <a:off x="3884613" y="0"/>
+            <a:ext cx="2971800" cy="458788"/>
+          </a:xfrm>
+          <a:prstGeom prst="rect">
+            <a:avLst/>
+          </a:prstGeom>
+        </p:spPr>
+        <p:txBody>
+          <a:bodyPr vert="horz" lIns="91440" tIns="45720" rIns="91440" bIns="45720" rtlCol="0"/>
+          <a:lstStyle>
+            <a:lvl1pPr algn="r">
+              <a:defRPr sz="1200"/>
+            </a:lvl1pPr>
+          </a:lstStyle>
+          <a:p>
+            <a:fld id="{D1D65448-90E9-4537-896B-E7B509937D81}" type="datetimeFigureOut">
+              <a:rPr lang="en-US" smtClean="0"/>
+              <a:t>3/18/2023</a:t>
+            </a:fld>
+            <a:endParaRPr lang="en-US"/>
+          </a:p>
+        </p:txBody>
+      </p:sp>
+      <p:sp>
+        <p:nvSpPr>
+          <p:cNvPr id="4" name="Footer Placeholder 3">
+            <a:extLst>
+              <a:ext uri="{FF2B5EF4-FFF2-40B4-BE49-F238E27FC236}">
+                <a16:creationId xmlns:a16="http://schemas.microsoft.com/office/drawing/2014/main" id="{CACF6CC4-3EF1-ACA9-653B-BAE4647C0EEA}"/>
+              </a:ext>
+            </a:extLst>
+          </p:cNvPr>
+          <p:cNvSpPr>
+            <a:spLocks noGrp="1"/>
+          </p:cNvSpPr>
+          <p:nvPr>
+            <p:ph type="ftr" sz="quarter" idx="2"/>
+          </p:nvPr>
+        </p:nvSpPr>
+        <p:spPr>
+          <a:xfrm>
+            <a:off x="0" y="8685213"/>
+            <a:ext cx="2971800" cy="458787"/>
+          </a:xfrm>
+          <a:prstGeom prst="rect">
+            <a:avLst/>
+          </a:prstGeom>
+        </p:spPr>
+        <p:txBody>
+          <a:bodyPr vert="horz" lIns="91440" tIns="45720" rIns="91440" bIns="45720" rtlCol="0" anchor="b"/>
+          <a:lstStyle>
+            <a:lvl1pPr algn="l">
+              <a:defRPr sz="1200"/>
+            </a:lvl1pPr>
+          </a:lstStyle>
+          <a:p>
+            <a:endParaRPr lang="en-US"/>
+          </a:p>
+        </p:txBody>
+      </p:sp>
+      <p:sp>
+        <p:nvSpPr>
+          <p:cNvPr id="5" name="Slide Number Placeholder 4">
+            <a:extLst>
+              <a:ext uri="{FF2B5EF4-FFF2-40B4-BE49-F238E27FC236}">
+                <a16:creationId xmlns:a16="http://schemas.microsoft.com/office/drawing/2014/main" id="{F235F8B1-6003-8ACF-98A8-237D2461D6A1}"/>
+              </a:ext>
+            </a:extLst>
+          </p:cNvPr>
+          <p:cNvSpPr>
+            <a:spLocks noGrp="1"/>
+          </p:cNvSpPr>
+          <p:nvPr>
+            <p:ph type="sldNum" sz="quarter" idx="3"/>
+          </p:nvPr>
+        </p:nvSpPr>
+        <p:spPr>
+          <a:xfrm>
+            <a:off x="3884613" y="8685213"/>
+            <a:ext cx="2971800" cy="458787"/>
+          </a:xfrm>
+          <a:prstGeom prst="rect">
+            <a:avLst/>
+          </a:prstGeom>
+        </p:spPr>
+        <p:txBody>
+          <a:bodyPr vert="horz" lIns="91440" tIns="45720" rIns="91440" bIns="45720" rtlCol="0" anchor="b"/>
+          <a:lstStyle>
+            <a:lvl1pPr algn="r">
+              <a:defRPr sz="1200"/>
+            </a:lvl1pPr>
+          </a:lstStyle>
+          <a:p>
+            <a:fld id="{F5A9C68D-2CC0-44B4-AD4C-D3B40E47D53E}" type="slidenum">
+              <a:rPr lang="en-US" smtClean="0"/>
+              <a:t>‹#›</a:t>
+            </a:fld>
+            <a:endParaRPr lang="en-US"/>
+          </a:p>
+        </p:txBody>
+      </p:sp>
+    </p:spTree>
+    <p:extLst>
+      <p:ext uri="{BB962C8B-B14F-4D97-AF65-F5344CB8AC3E}">
+        <p14:creationId xmlns:p14="http://schemas.microsoft.com/office/powerpoint/2010/main" val="3940246755"/>
+      </p:ext>
+    </p:extLst>
+  </p:cSld>
+  <p:clrMap bg1="lt1" tx1="dk1" bg2="lt2" tx2="dk2" accent1="accent1" accent2="accent2" accent3="accent3" accent4="accent4" accent5="accent5" accent6="accent6" hlink="hlink" folHlink="folHlink"/>
+</p:handoutMaster>
 </file>
 
 <file path=ppt/slideLayouts/slideLayout1.xml><?xml version="1.0" encoding="utf-8"?>
@@ -3404,10 +3596,10 @@
       </p:grpSpPr>
       <p:sp>
         <p:nvSpPr>
-          <p:cNvPr id="4" name="Flowchart: Magnetic Disk 3">
-            <a:extLst>
-              <a:ext uri="{FF2B5EF4-FFF2-40B4-BE49-F238E27FC236}">
-                <a16:creationId xmlns:a16="http://schemas.microsoft.com/office/drawing/2014/main" id="{40F2BBF4-10E6-3BBE-0607-2E793BAD9C69}"/>
+          <p:cNvPr id="67" name="Rectangle: Rounded Corners 66">
+            <a:extLst>
+              <a:ext uri="{FF2B5EF4-FFF2-40B4-BE49-F238E27FC236}">
+                <a16:creationId xmlns:a16="http://schemas.microsoft.com/office/drawing/2014/main" id="{A4DDEC57-C32F-5B99-F0DE-5350D627D440}"/>
               </a:ext>
             </a:extLst>
           </p:cNvPr>
@@ -3416,10 +3608,10 @@
         </p:nvSpPr>
         <p:spPr>
           <a:xfrm>
-            <a:off x="3476899" y="1532294"/>
-            <a:ext cx="914400" cy="612648"/>
-          </a:xfrm>
-          <a:prstGeom prst="flowChartMagneticDisk">
+            <a:off x="2331659" y="1185003"/>
+            <a:ext cx="9496307" cy="213172"/>
+          </a:xfrm>
+          <a:prstGeom prst="roundRect">
             <a:avLst/>
           </a:prstGeom>
         </p:spPr>
@@ -3445,18 +3637,18 @@
           <a:p>
             <a:pPr algn="ctr"/>
             <a:r>
-              <a:rPr lang="en-US" sz="1200" dirty="0"/>
-              <a:t>Feature Store</a:t>
-            </a:r>
-          </a:p>
-        </p:txBody>
-      </p:sp>
-      <p:sp>
-        <p:nvSpPr>
-          <p:cNvPr id="5" name="Flowchart: Magnetic Disk 4">
-            <a:extLst>
-              <a:ext uri="{FF2B5EF4-FFF2-40B4-BE49-F238E27FC236}">
-                <a16:creationId xmlns:a16="http://schemas.microsoft.com/office/drawing/2014/main" id="{62A0BD15-92FE-F3A3-67AD-BA61F79F5B1D}"/>
+              <a:rPr lang="en-US" dirty="0"/>
+              <a:t>Kubernetes</a:t>
+            </a:r>
+          </a:p>
+        </p:txBody>
+      </p:sp>
+      <p:sp>
+        <p:nvSpPr>
+          <p:cNvPr id="4" name="Flowchart: Magnetic Disk 3">
+            <a:extLst>
+              <a:ext uri="{FF2B5EF4-FFF2-40B4-BE49-F238E27FC236}">
+                <a16:creationId xmlns:a16="http://schemas.microsoft.com/office/drawing/2014/main" id="{40F2BBF4-10E6-3BBE-0607-2E793BAD9C69}"/>
               </a:ext>
             </a:extLst>
           </p:cNvPr>
@@ -3465,7 +3657,7 @@
         </p:nvSpPr>
         <p:spPr>
           <a:xfrm>
-            <a:off x="8850952" y="1631559"/>
+            <a:off x="3572693" y="2118205"/>
             <a:ext cx="914400" cy="612648"/>
           </a:xfrm>
           <a:prstGeom prst="flowChartMagneticDisk">
@@ -3495,17 +3687,17 @@
             <a:pPr algn="ctr"/>
             <a:r>
               <a:rPr lang="en-US" sz="1200" dirty="0"/>
-              <a:t>Artifact Store</a:t>
-            </a:r>
-          </a:p>
-        </p:txBody>
-      </p:sp>
-      <p:sp>
-        <p:nvSpPr>
-          <p:cNvPr id="6" name="Flowchart: Magnetic Disk 5">
-            <a:extLst>
-              <a:ext uri="{FF2B5EF4-FFF2-40B4-BE49-F238E27FC236}">
-                <a16:creationId xmlns:a16="http://schemas.microsoft.com/office/drawing/2014/main" id="{5AD3E03E-C55B-3B84-2CB8-51877C9EA16D}"/>
+              <a:t>Feature Store</a:t>
+            </a:r>
+          </a:p>
+        </p:txBody>
+      </p:sp>
+      <p:sp>
+        <p:nvSpPr>
+          <p:cNvPr id="5" name="Flowchart: Magnetic Disk 4">
+            <a:extLst>
+              <a:ext uri="{FF2B5EF4-FFF2-40B4-BE49-F238E27FC236}">
+                <a16:creationId xmlns:a16="http://schemas.microsoft.com/office/drawing/2014/main" id="{62A0BD15-92FE-F3A3-67AD-BA61F79F5B1D}"/>
               </a:ext>
             </a:extLst>
           </p:cNvPr>
@@ -3514,7 +3706,7 @@
         </p:nvSpPr>
         <p:spPr>
           <a:xfrm>
-            <a:off x="1310936" y="1356719"/>
+            <a:off x="8946746" y="2217470"/>
             <a:ext cx="914400" cy="612648"/>
           </a:xfrm>
           <a:prstGeom prst="flowChartMagneticDisk">
@@ -3544,17 +3736,17 @@
             <a:pPr algn="ctr"/>
             <a:r>
               <a:rPr lang="en-US" sz="1200" dirty="0"/>
-              <a:t>Offline Store</a:t>
-            </a:r>
-          </a:p>
-        </p:txBody>
-      </p:sp>
-      <p:sp>
-        <p:nvSpPr>
-          <p:cNvPr id="7" name="Rectangle: Rounded Corners 6">
-            <a:extLst>
-              <a:ext uri="{FF2B5EF4-FFF2-40B4-BE49-F238E27FC236}">
-                <a16:creationId xmlns:a16="http://schemas.microsoft.com/office/drawing/2014/main" id="{BC294450-4A8B-C142-97E9-555ADC0E2E85}"/>
+              <a:t>Artifact Store</a:t>
+            </a:r>
+          </a:p>
+        </p:txBody>
+      </p:sp>
+      <p:sp>
+        <p:nvSpPr>
+          <p:cNvPr id="6" name="Flowchart: Magnetic Disk 5">
+            <a:extLst>
+              <a:ext uri="{FF2B5EF4-FFF2-40B4-BE49-F238E27FC236}">
+                <a16:creationId xmlns:a16="http://schemas.microsoft.com/office/drawing/2014/main" id="{5AD3E03E-C55B-3B84-2CB8-51877C9EA16D}"/>
               </a:ext>
             </a:extLst>
           </p:cNvPr>
@@ -3563,10 +3755,10 @@
         </p:nvSpPr>
         <p:spPr>
           <a:xfrm>
-            <a:off x="1350231" y="5347528"/>
-            <a:ext cx="10477736" cy="363682"/>
-          </a:xfrm>
-          <a:prstGeom prst="roundRect">
+            <a:off x="1406730" y="1942630"/>
+            <a:ext cx="914400" cy="612648"/>
+          </a:xfrm>
+          <a:prstGeom prst="flowChartMagneticDisk">
             <a:avLst/>
           </a:prstGeom>
         </p:spPr>
@@ -3592,18 +3784,18 @@
           <a:p>
             <a:pPr algn="ctr"/>
             <a:r>
-              <a:rPr lang="en-US" dirty="0"/>
-              <a:t>Kubernetes</a:t>
-            </a:r>
-          </a:p>
-        </p:txBody>
-      </p:sp>
-      <p:sp>
-        <p:nvSpPr>
-          <p:cNvPr id="9" name="Rectangle: Rounded Corners 8">
-            <a:extLst>
-              <a:ext uri="{FF2B5EF4-FFF2-40B4-BE49-F238E27FC236}">
-                <a16:creationId xmlns:a16="http://schemas.microsoft.com/office/drawing/2014/main" id="{3619FDDD-ABDB-30F2-31B8-EDB5C4E1BE26}"/>
+              <a:rPr lang="en-US" sz="1200" dirty="0"/>
+              <a:t>Offline Store</a:t>
+            </a:r>
+          </a:p>
+        </p:txBody>
+      </p:sp>
+      <p:sp>
+        <p:nvSpPr>
+          <p:cNvPr id="7" name="Rectangle: Rounded Corners 6">
+            <a:extLst>
+              <a:ext uri="{FF2B5EF4-FFF2-40B4-BE49-F238E27FC236}">
+                <a16:creationId xmlns:a16="http://schemas.microsoft.com/office/drawing/2014/main" id="{BC294450-4A8B-C142-97E9-555ADC0E2E85}"/>
               </a:ext>
             </a:extLst>
           </p:cNvPr>
@@ -3612,15 +3804,12 @@
         </p:nvSpPr>
         <p:spPr>
           <a:xfrm>
-            <a:off x="11025051" y="3333862"/>
-            <a:ext cx="631677" cy="363682"/>
+            <a:off x="2321130" y="5778800"/>
+            <a:ext cx="9543864" cy="213172"/>
           </a:xfrm>
           <a:prstGeom prst="roundRect">
             <a:avLst/>
           </a:prstGeom>
-          <a:solidFill>
-            <a:srgbClr val="00B050"/>
-          </a:solidFill>
         </p:spPr>
         <p:style>
           <a:lnRef idx="2">
@@ -3644,19 +3833,18 @@
           <a:p>
             <a:pPr algn="ctr"/>
             <a:r>
-              <a:rPr lang="en-US" sz="1200" dirty="0" err="1"/>
-              <a:t>KATib</a:t>
-            </a:r>
-            <a:endParaRPr lang="en-US" sz="1200" dirty="0"/>
-          </a:p>
-        </p:txBody>
-      </p:sp>
-      <p:sp>
-        <p:nvSpPr>
-          <p:cNvPr id="10" name="Rectangle: Rounded Corners 9">
-            <a:extLst>
-              <a:ext uri="{FF2B5EF4-FFF2-40B4-BE49-F238E27FC236}">
-                <a16:creationId xmlns:a16="http://schemas.microsoft.com/office/drawing/2014/main" id="{D5397FA8-15F3-E1FC-1C78-5FB0ED3FB95A}"/>
+              <a:rPr lang="en-US" dirty="0"/>
+              <a:t>Kubernetes</a:t>
+            </a:r>
+          </a:p>
+        </p:txBody>
+      </p:sp>
+      <p:sp>
+        <p:nvSpPr>
+          <p:cNvPr id="9" name="Rectangle: Rounded Corners 8">
+            <a:extLst>
+              <a:ext uri="{FF2B5EF4-FFF2-40B4-BE49-F238E27FC236}">
+                <a16:creationId xmlns:a16="http://schemas.microsoft.com/office/drawing/2014/main" id="{3619FDDD-ABDB-30F2-31B8-EDB5C4E1BE26}"/>
               </a:ext>
             </a:extLst>
           </p:cNvPr>
@@ -3665,14 +3853,14 @@
         </p:nvSpPr>
         <p:spPr>
           <a:xfrm>
-            <a:off x="2869477" y="528108"/>
-            <a:ext cx="8958490" cy="308897"/>
+            <a:off x="11120845" y="3919773"/>
+            <a:ext cx="631677" cy="363682"/>
           </a:xfrm>
           <a:prstGeom prst="roundRect">
             <a:avLst/>
           </a:prstGeom>
           <a:solidFill>
-            <a:srgbClr val="7030A0"/>
+            <a:srgbClr val="00B050"/>
           </a:solidFill>
         </p:spPr>
         <p:style>
@@ -3697,18 +3885,19 @@
           <a:p>
             <a:pPr algn="ctr"/>
             <a:r>
-              <a:rPr lang="en-US" sz="1200" dirty="0"/>
-              <a:t>GitHub Action</a:t>
-            </a:r>
-          </a:p>
-        </p:txBody>
-      </p:sp>
-      <p:sp>
-        <p:nvSpPr>
-          <p:cNvPr id="11" name="Rectangle: Rounded Corners 10">
-            <a:extLst>
-              <a:ext uri="{FF2B5EF4-FFF2-40B4-BE49-F238E27FC236}">
-                <a16:creationId xmlns:a16="http://schemas.microsoft.com/office/drawing/2014/main" id="{7B94EA4D-2834-0069-9533-16D3B6D9C2E3}"/>
+              <a:rPr lang="en-US" sz="1200" dirty="0" err="1"/>
+              <a:t>KATib</a:t>
+            </a:r>
+            <a:endParaRPr lang="en-US" sz="1200" dirty="0"/>
+          </a:p>
+        </p:txBody>
+      </p:sp>
+      <p:sp>
+        <p:nvSpPr>
+          <p:cNvPr id="10" name="Rectangle: Rounded Corners 9">
+            <a:extLst>
+              <a:ext uri="{FF2B5EF4-FFF2-40B4-BE49-F238E27FC236}">
+                <a16:creationId xmlns:a16="http://schemas.microsoft.com/office/drawing/2014/main" id="{D5397FA8-15F3-E1FC-1C78-5FB0ED3FB95A}"/>
               </a:ext>
             </a:extLst>
           </p:cNvPr>
@@ -3717,12 +3906,15 @@
         </p:nvSpPr>
         <p:spPr>
           <a:xfrm>
-            <a:off x="523104" y="5782985"/>
-            <a:ext cx="1236617" cy="914400"/>
+            <a:off x="2331659" y="528108"/>
+            <a:ext cx="9496308" cy="308897"/>
           </a:xfrm>
           <a:prstGeom prst="roundRect">
             <a:avLst/>
           </a:prstGeom>
+          <a:solidFill>
+            <a:srgbClr val="7030A0"/>
+          </a:solidFill>
         </p:spPr>
         <p:style>
           <a:lnRef idx="2">
@@ -3746,22 +3938,18 @@
           <a:p>
             <a:pPr algn="ctr"/>
             <a:r>
-              <a:rPr lang="en-US" sz="1200" dirty="0" err="1"/>
-              <a:t>Jupyter</a:t>
-            </a:r>
-            <a:r>
               <a:rPr lang="en-US" sz="1200" dirty="0"/>
-              <a:t> Notebook</a:t>
-            </a:r>
-          </a:p>
-        </p:txBody>
-      </p:sp>
-      <p:sp>
-        <p:nvSpPr>
-          <p:cNvPr id="12" name="Rectangle: Rounded Corners 11">
-            <a:extLst>
-              <a:ext uri="{FF2B5EF4-FFF2-40B4-BE49-F238E27FC236}">
-                <a16:creationId xmlns:a16="http://schemas.microsoft.com/office/drawing/2014/main" id="{1F57FE47-ADEF-8F9C-5302-17BA3D5CBC8A}"/>
+              <a:t>GitHub Action</a:t>
+            </a:r>
+          </a:p>
+        </p:txBody>
+      </p:sp>
+      <p:sp>
+        <p:nvSpPr>
+          <p:cNvPr id="11" name="Rectangle: Rounded Corners 10">
+            <a:extLst>
+              <a:ext uri="{FF2B5EF4-FFF2-40B4-BE49-F238E27FC236}">
+                <a16:creationId xmlns:a16="http://schemas.microsoft.com/office/drawing/2014/main" id="{7B94EA4D-2834-0069-9533-16D3B6D9C2E3}"/>
               </a:ext>
             </a:extLst>
           </p:cNvPr>
@@ -3770,14 +3958,14 @@
         </p:nvSpPr>
         <p:spPr>
           <a:xfrm>
-            <a:off x="8850952" y="1328631"/>
-            <a:ext cx="914400" cy="205279"/>
+            <a:off x="6199754" y="6136850"/>
+            <a:ext cx="1236617" cy="462616"/>
           </a:xfrm>
           <a:prstGeom prst="roundRect">
             <a:avLst/>
           </a:prstGeom>
           <a:solidFill>
-            <a:srgbClr val="00B050"/>
+            <a:srgbClr val="7030A0"/>
           </a:solidFill>
         </p:spPr>
         <p:style>
@@ -3803,18 +3991,21 @@
             <a:pPr algn="ctr"/>
             <a:r>
               <a:rPr lang="en-US" sz="1200" dirty="0" err="1"/>
-              <a:t>Minio</a:t>
-            </a:r>
-            <a:endParaRPr lang="en-US" sz="1200" dirty="0"/>
-          </a:p>
-        </p:txBody>
-      </p:sp>
-      <p:sp>
-        <p:nvSpPr>
-          <p:cNvPr id="13" name="Rectangle: Rounded Corners 12">
-            <a:extLst>
-              <a:ext uri="{FF2B5EF4-FFF2-40B4-BE49-F238E27FC236}">
-                <a16:creationId xmlns:a16="http://schemas.microsoft.com/office/drawing/2014/main" id="{22929DDD-B006-06E0-ED06-E727D3C4EEBC}"/>
+              <a:t>Jupyter</a:t>
+            </a:r>
+            <a:r>
+              <a:rPr lang="en-US" sz="1200" dirty="0"/>
+              <a:t> Notebook</a:t>
+            </a:r>
+          </a:p>
+        </p:txBody>
+      </p:sp>
+      <p:sp>
+        <p:nvSpPr>
+          <p:cNvPr id="12" name="Rectangle: Rounded Corners 11">
+            <a:extLst>
+              <a:ext uri="{FF2B5EF4-FFF2-40B4-BE49-F238E27FC236}">
+                <a16:creationId xmlns:a16="http://schemas.microsoft.com/office/drawing/2014/main" id="{1F57FE47-ADEF-8F9C-5302-17BA3D5CBC8A}"/>
               </a:ext>
             </a:extLst>
           </p:cNvPr>
@@ -3823,8 +4014,8 @@
         </p:nvSpPr>
         <p:spPr>
           <a:xfrm>
-            <a:off x="4713078" y="1656777"/>
-            <a:ext cx="827679" cy="363682"/>
+            <a:off x="8946746" y="1914542"/>
+            <a:ext cx="914400" cy="205279"/>
           </a:xfrm>
           <a:prstGeom prst="roundRect">
             <a:avLst/>
@@ -3855,18 +4046,19 @@
           <a:p>
             <a:pPr algn="ctr"/>
             <a:r>
-              <a:rPr lang="en-US" sz="1200" dirty="0"/>
-              <a:t>Feast CLI Apply</a:t>
-            </a:r>
-          </a:p>
-        </p:txBody>
-      </p:sp>
-      <p:sp>
-        <p:nvSpPr>
-          <p:cNvPr id="14" name="Flowchart: Magnetic Disk 13">
-            <a:extLst>
-              <a:ext uri="{FF2B5EF4-FFF2-40B4-BE49-F238E27FC236}">
-                <a16:creationId xmlns:a16="http://schemas.microsoft.com/office/drawing/2014/main" id="{35175C91-9E53-6ABE-586C-36BC6130DCB3}"/>
+              <a:rPr lang="en-US" sz="1200" dirty="0" err="1"/>
+              <a:t>Minio</a:t>
+            </a:r>
+            <a:endParaRPr lang="en-US" sz="1200" dirty="0"/>
+          </a:p>
+        </p:txBody>
+      </p:sp>
+      <p:sp>
+        <p:nvSpPr>
+          <p:cNvPr id="13" name="Rectangle: Rounded Corners 12">
+            <a:extLst>
+              <a:ext uri="{FF2B5EF4-FFF2-40B4-BE49-F238E27FC236}">
+                <a16:creationId xmlns:a16="http://schemas.microsoft.com/office/drawing/2014/main" id="{22929DDD-B006-06E0-ED06-E727D3C4EEBC}"/>
               </a:ext>
             </a:extLst>
           </p:cNvPr>
@@ -3875,12 +4067,15 @@
         </p:nvSpPr>
         <p:spPr>
           <a:xfrm>
-            <a:off x="9568036" y="2562171"/>
-            <a:ext cx="1304760" cy="471660"/>
-          </a:xfrm>
-          <a:prstGeom prst="flowChartMagneticDisk">
+            <a:off x="4808872" y="2242688"/>
+            <a:ext cx="827679" cy="363682"/>
+          </a:xfrm>
+          <a:prstGeom prst="roundRect">
             <a:avLst/>
           </a:prstGeom>
+          <a:solidFill>
+            <a:srgbClr val="00B050"/>
+          </a:solidFill>
         </p:spPr>
         <p:style>
           <a:lnRef idx="2">
@@ -3905,17 +4100,17 @@
             <a:pPr algn="ctr"/>
             <a:r>
               <a:rPr lang="en-US" sz="1200" dirty="0"/>
-              <a:t>Container Image Registry</a:t>
-            </a:r>
-          </a:p>
-        </p:txBody>
-      </p:sp>
-      <p:sp>
-        <p:nvSpPr>
-          <p:cNvPr id="15" name="Flowchart: Magnetic Disk 14">
-            <a:extLst>
-              <a:ext uri="{FF2B5EF4-FFF2-40B4-BE49-F238E27FC236}">
-                <a16:creationId xmlns:a16="http://schemas.microsoft.com/office/drawing/2014/main" id="{A5E39389-34A8-1BF2-8A05-D159F3F101C3}"/>
+              <a:t>Feast CLI Apply</a:t>
+            </a:r>
+          </a:p>
+        </p:txBody>
+      </p:sp>
+      <p:sp>
+        <p:nvSpPr>
+          <p:cNvPr id="14" name="Flowchart: Magnetic Disk 13">
+            <a:extLst>
+              <a:ext uri="{FF2B5EF4-FFF2-40B4-BE49-F238E27FC236}">
+                <a16:creationId xmlns:a16="http://schemas.microsoft.com/office/drawing/2014/main" id="{35175C91-9E53-6ABE-586C-36BC6130DCB3}"/>
               </a:ext>
             </a:extLst>
           </p:cNvPr>
@@ -3924,7 +4119,56 @@
         </p:nvSpPr>
         <p:spPr>
           <a:xfrm>
-            <a:off x="10591351" y="4706626"/>
+            <a:off x="9663830" y="3148082"/>
+            <a:ext cx="1304760" cy="471660"/>
+          </a:xfrm>
+          <a:prstGeom prst="flowChartMagneticDisk">
+            <a:avLst/>
+          </a:prstGeom>
+        </p:spPr>
+        <p:style>
+          <a:lnRef idx="2">
+            <a:schemeClr val="accent1">
+              <a:shade val="50000"/>
+            </a:schemeClr>
+          </a:lnRef>
+          <a:fillRef idx="1">
+            <a:schemeClr val="accent1"/>
+          </a:fillRef>
+          <a:effectRef idx="0">
+            <a:schemeClr val="accent1"/>
+          </a:effectRef>
+          <a:fontRef idx="minor">
+            <a:schemeClr val="lt1"/>
+          </a:fontRef>
+        </p:style>
+        <p:txBody>
+          <a:bodyPr rtlCol="0" anchor="ctr"/>
+          <a:lstStyle/>
+          <a:p>
+            <a:pPr algn="ctr"/>
+            <a:r>
+              <a:rPr lang="en-US" sz="1200" dirty="0"/>
+              <a:t>Container Image Registry</a:t>
+            </a:r>
+          </a:p>
+        </p:txBody>
+      </p:sp>
+      <p:sp>
+        <p:nvSpPr>
+          <p:cNvPr id="15" name="Flowchart: Magnetic Disk 14">
+            <a:extLst>
+              <a:ext uri="{FF2B5EF4-FFF2-40B4-BE49-F238E27FC236}">
+                <a16:creationId xmlns:a16="http://schemas.microsoft.com/office/drawing/2014/main" id="{A5E39389-34A8-1BF2-8A05-D159F3F101C3}"/>
+              </a:ext>
+            </a:extLst>
+          </p:cNvPr>
+          <p:cNvSpPr/>
+          <p:nvPr/>
+        </p:nvSpPr>
+        <p:spPr>
+          <a:xfrm>
+            <a:off x="10687145" y="5292537"/>
             <a:ext cx="1236616" cy="393529"/>
           </a:xfrm>
           <a:prstGeom prst="flowChartMagneticDisk">
@@ -4087,8 +4331,8 @@
         </p:nvSpPr>
         <p:spPr>
           <a:xfrm>
-            <a:off x="1635331" y="830698"/>
-            <a:ext cx="265610" cy="487680"/>
+            <a:off x="1731125" y="837005"/>
+            <a:ext cx="265610" cy="1067284"/>
           </a:xfrm>
           <a:prstGeom prst="downArrow">
             <a:avLst/>
@@ -4138,7 +4382,7 @@
         </p:nvSpPr>
         <p:spPr>
           <a:xfrm>
-            <a:off x="2235865" y="2735184"/>
+            <a:off x="2331659" y="3321095"/>
             <a:ext cx="3430342" cy="363682"/>
           </a:xfrm>
           <a:prstGeom prst="roundRect">
@@ -4171,7 +4415,7 @@
             <a:pPr algn="ctr"/>
             <a:r>
               <a:rPr lang="en-US" sz="1200" dirty="0"/>
-              <a:t>Kubeflow Pipeline</a:t>
+              <a:t>Kubeflow Pipeline SDK</a:t>
             </a:r>
           </a:p>
         </p:txBody>
@@ -4190,7 +4434,7 @@
         </p:nvSpPr>
         <p:spPr>
           <a:xfrm rot="10800000">
-            <a:off x="3799115" y="2179232"/>
+            <a:off x="3894909" y="2765143"/>
             <a:ext cx="265610" cy="487680"/>
           </a:xfrm>
           <a:prstGeom prst="downArrow">
@@ -4236,7 +4480,7 @@
         </p:nvSpPr>
         <p:spPr>
           <a:xfrm>
-            <a:off x="2235865" y="3185750"/>
+            <a:off x="2331659" y="3771661"/>
             <a:ext cx="910042" cy="569842"/>
           </a:xfrm>
           <a:prstGeom prst="roundRect">
@@ -4288,7 +4532,7 @@
         </p:nvSpPr>
         <p:spPr>
           <a:xfrm>
-            <a:off x="3416623" y="3185750"/>
+            <a:off x="3512417" y="3771661"/>
             <a:ext cx="1046381" cy="569842"/>
           </a:xfrm>
           <a:prstGeom prst="roundRect">
@@ -4340,7 +4584,7 @@
         </p:nvSpPr>
         <p:spPr>
           <a:xfrm>
-            <a:off x="3197767" y="3383757"/>
+            <a:off x="3293561" y="3969668"/>
             <a:ext cx="151450" cy="161351"/>
           </a:xfrm>
           <a:prstGeom prst="rightArrow">
@@ -4386,7 +4630,7 @@
         </p:nvSpPr>
         <p:spPr>
           <a:xfrm>
-            <a:off x="4756165" y="3185750"/>
+            <a:off x="4851959" y="3771661"/>
             <a:ext cx="910042" cy="569842"/>
           </a:xfrm>
           <a:prstGeom prst="roundRect">
@@ -4438,7 +4682,7 @@
         </p:nvSpPr>
         <p:spPr>
           <a:xfrm>
-            <a:off x="4552857" y="3383756"/>
+            <a:off x="4648651" y="3969667"/>
             <a:ext cx="172371" cy="161351"/>
           </a:xfrm>
           <a:prstGeom prst="rightArrow">
@@ -4539,8 +4783,8 @@
         </p:nvSpPr>
         <p:spPr>
           <a:xfrm>
-            <a:off x="2889509" y="871083"/>
-            <a:ext cx="265610" cy="1795829"/>
+            <a:off x="2985303" y="866028"/>
+            <a:ext cx="265610" cy="2386795"/>
           </a:xfrm>
           <a:prstGeom prst="downArrow">
             <a:avLst/>
@@ -4588,7 +4832,7 @@
         </p:nvSpPr>
         <p:spPr>
           <a:xfrm rot="5400000">
-            <a:off x="1119654" y="2574117"/>
+            <a:off x="1215448" y="3160028"/>
             <a:ext cx="1593346" cy="498565"/>
           </a:xfrm>
           <a:prstGeom prst="bentUpArrow">
@@ -4634,7 +4878,7 @@
         </p:nvSpPr>
         <p:spPr>
           <a:xfrm>
-            <a:off x="5810402" y="2298111"/>
+            <a:off x="5906196" y="2884022"/>
             <a:ext cx="914400" cy="612648"/>
           </a:xfrm>
           <a:prstGeom prst="flowChartMagneticDisk">
@@ -4683,7 +4927,7 @@
         </p:nvSpPr>
         <p:spPr>
           <a:xfrm>
-            <a:off x="5811217" y="3188273"/>
+            <a:off x="5907011" y="3774184"/>
             <a:ext cx="563457" cy="356833"/>
           </a:xfrm>
           <a:prstGeom prst="bentUpArrow">
@@ -4733,7 +4977,7 @@
         </p:nvSpPr>
         <p:spPr>
           <a:xfrm>
-            <a:off x="5805742" y="1829401"/>
+            <a:off x="5901536" y="2415312"/>
             <a:ext cx="1200063" cy="327227"/>
           </a:xfrm>
           <a:prstGeom prst="flowChartMagneticDisk">
@@ -4840,7 +5084,7 @@
         </p:nvSpPr>
         <p:spPr>
           <a:xfrm>
-            <a:off x="4483912" y="1768997"/>
+            <a:off x="4579706" y="2354908"/>
             <a:ext cx="172371" cy="161351"/>
           </a:xfrm>
           <a:prstGeom prst="rightArrow">
@@ -4886,7 +5130,7 @@
         </p:nvSpPr>
         <p:spPr>
           <a:xfrm rot="19674817">
-            <a:off x="5351032" y="1372595"/>
+            <a:off x="5446826" y="1958506"/>
             <a:ext cx="392849" cy="192774"/>
           </a:xfrm>
           <a:prstGeom prst="rightArrow">
@@ -4932,8 +5176,8 @@
         </p:nvSpPr>
         <p:spPr>
           <a:xfrm>
-            <a:off x="4947332" y="914168"/>
-            <a:ext cx="265610" cy="612648"/>
+            <a:off x="5017290" y="883993"/>
+            <a:ext cx="265610" cy="1341648"/>
           </a:xfrm>
           <a:prstGeom prst="downArrow">
             <a:avLst/>
@@ -4981,7 +5225,7 @@
         </p:nvSpPr>
         <p:spPr>
           <a:xfrm>
-            <a:off x="5805742" y="1058836"/>
+            <a:off x="5901536" y="1644747"/>
             <a:ext cx="914400" cy="612648"/>
           </a:xfrm>
           <a:prstGeom prst="flowChartMagneticDisk">
@@ -5035,7 +5279,7 @@
         </p:nvSpPr>
         <p:spPr>
           <a:xfrm rot="18416747">
-            <a:off x="5344517" y="2006723"/>
+            <a:off x="5440311" y="2592634"/>
             <a:ext cx="166402" cy="487680"/>
           </a:xfrm>
           <a:prstGeom prst="downArrow">
@@ -5081,7 +5325,7 @@
         </p:nvSpPr>
         <p:spPr>
           <a:xfrm rot="16200000">
-            <a:off x="7145086" y="1821761"/>
+            <a:off x="7240880" y="2407672"/>
             <a:ext cx="265610" cy="342505"/>
           </a:xfrm>
           <a:prstGeom prst="downArrow">
@@ -5127,7 +5371,7 @@
         </p:nvSpPr>
         <p:spPr>
           <a:xfrm>
-            <a:off x="7510206" y="1669184"/>
+            <a:off x="7606000" y="2255095"/>
             <a:ext cx="910042" cy="569842"/>
           </a:xfrm>
           <a:prstGeom prst="roundRect">
@@ -5179,8 +5423,8 @@
         </p:nvSpPr>
         <p:spPr>
           <a:xfrm>
-            <a:off x="7806989" y="902546"/>
-            <a:ext cx="265610" cy="363682"/>
+            <a:off x="7902783" y="881141"/>
+            <a:ext cx="265610" cy="970998"/>
           </a:xfrm>
           <a:prstGeom prst="downArrow">
             <a:avLst/>
@@ -5228,7 +5472,7 @@
         </p:nvSpPr>
         <p:spPr>
           <a:xfrm rot="16200000">
-            <a:off x="8502794" y="1773414"/>
+            <a:off x="8598588" y="2359325"/>
             <a:ext cx="265610" cy="342505"/>
           </a:xfrm>
           <a:prstGeom prst="downArrow">
@@ -5274,7 +5518,7 @@
         </p:nvSpPr>
         <p:spPr>
           <a:xfrm>
-            <a:off x="1310936" y="2074704"/>
+            <a:off x="1406730" y="2660615"/>
             <a:ext cx="914400" cy="205279"/>
           </a:xfrm>
           <a:prstGeom prst="roundRect">
@@ -5326,7 +5570,7 @@
         </p:nvSpPr>
         <p:spPr>
           <a:xfrm>
-            <a:off x="5808482" y="876847"/>
+            <a:off x="5904276" y="1462758"/>
             <a:ext cx="914400" cy="205279"/>
           </a:xfrm>
           <a:prstGeom prst="roundRect">
@@ -5378,7 +5622,7 @@
         </p:nvSpPr>
         <p:spPr>
           <a:xfrm>
-            <a:off x="5850536" y="2943744"/>
+            <a:off x="5946330" y="3529655"/>
             <a:ext cx="914400" cy="205279"/>
           </a:xfrm>
           <a:prstGeom prst="roundRect">
@@ -5430,8 +5674,8 @@
         </p:nvSpPr>
         <p:spPr>
           <a:xfrm>
-            <a:off x="7510206" y="1261366"/>
-            <a:ext cx="910042" cy="363682"/>
+            <a:off x="7606000" y="1847277"/>
+            <a:ext cx="1027480" cy="363682"/>
           </a:xfrm>
           <a:prstGeom prst="roundRect">
             <a:avLst/>
@@ -5463,7 +5707,7 @@
             <a:pPr algn="ctr"/>
             <a:r>
               <a:rPr lang="en-US" sz="1200" dirty="0"/>
-              <a:t>Kubeflow Pipeline</a:t>
+              <a:t>Kubeflow Pipeline SDK</a:t>
             </a:r>
           </a:p>
         </p:txBody>
@@ -5482,8 +5726,8 @@
         </p:nvSpPr>
         <p:spPr>
           <a:xfrm>
-            <a:off x="10063251" y="872189"/>
-            <a:ext cx="265610" cy="389177"/>
+            <a:off x="10159045" y="883994"/>
+            <a:ext cx="265610" cy="963284"/>
           </a:xfrm>
           <a:prstGeom prst="downArrow">
             <a:avLst/>
@@ -5531,7 +5775,7 @@
         </p:nvSpPr>
         <p:spPr>
           <a:xfrm>
-            <a:off x="9906597" y="1663532"/>
+            <a:off x="10002391" y="2249443"/>
             <a:ext cx="966199" cy="569842"/>
           </a:xfrm>
           <a:prstGeom prst="roundRect">
@@ -5583,7 +5827,7 @@
         </p:nvSpPr>
         <p:spPr>
           <a:xfrm>
-            <a:off x="9950563" y="1272311"/>
+            <a:off x="10046357" y="1858222"/>
             <a:ext cx="914400" cy="205279"/>
           </a:xfrm>
           <a:prstGeom prst="roundRect">
@@ -5635,7 +5879,7 @@
         </p:nvSpPr>
         <p:spPr>
           <a:xfrm>
-            <a:off x="10087611" y="2224821"/>
+            <a:off x="10183405" y="2810732"/>
             <a:ext cx="265610" cy="389177"/>
           </a:xfrm>
           <a:prstGeom prst="downArrow">
@@ -5684,8 +5928,8 @@
         </p:nvSpPr>
         <p:spPr>
           <a:xfrm>
-            <a:off x="11153296" y="844789"/>
-            <a:ext cx="265610" cy="1528992"/>
+            <a:off x="11249090" y="881141"/>
+            <a:ext cx="265610" cy="2078551"/>
           </a:xfrm>
           <a:prstGeom prst="downArrow">
             <a:avLst/>
@@ -5733,7 +5977,7 @@
         </p:nvSpPr>
         <p:spPr>
           <a:xfrm rot="16200000">
-            <a:off x="10275733" y="2929220"/>
+            <a:off x="10371527" y="3515131"/>
             <a:ext cx="471661" cy="910043"/>
           </a:xfrm>
           <a:prstGeom prst="bentArrow">
@@ -5783,7 +6027,7 @@
         </p:nvSpPr>
         <p:spPr>
           <a:xfrm>
-            <a:off x="10963861" y="2460047"/>
+            <a:off x="11059655" y="3045958"/>
             <a:ext cx="741069" cy="450712"/>
           </a:xfrm>
           <a:prstGeom prst="roundRect">
@@ -5839,7 +6083,7 @@
         </p:nvSpPr>
         <p:spPr>
           <a:xfrm>
-            <a:off x="11153296" y="2955296"/>
+            <a:off x="11249090" y="3541207"/>
             <a:ext cx="265610" cy="389177"/>
           </a:xfrm>
           <a:prstGeom prst="downArrow">
@@ -5888,7 +6132,7 @@
         </p:nvSpPr>
         <p:spPr>
           <a:xfrm>
-            <a:off x="11153296" y="3715861"/>
+            <a:off x="11249090" y="4301772"/>
             <a:ext cx="265610" cy="189335"/>
           </a:xfrm>
           <a:prstGeom prst="downArrow">
@@ -5937,7 +6181,7 @@
         </p:nvSpPr>
         <p:spPr>
           <a:xfrm>
-            <a:off x="10803001" y="3910073"/>
+            <a:off x="10898795" y="4495984"/>
             <a:ext cx="966199" cy="569842"/>
           </a:xfrm>
           <a:prstGeom prst="roundRect">
@@ -5989,7 +6233,7 @@
         </p:nvSpPr>
         <p:spPr>
           <a:xfrm>
-            <a:off x="11162773" y="4515232"/>
+            <a:off x="11258567" y="5101143"/>
             <a:ext cx="265610" cy="189335"/>
           </a:xfrm>
           <a:prstGeom prst="downArrow">
@@ -5998,6 +6242,257 @@
           <a:solidFill>
             <a:srgbClr val="7030A0"/>
           </a:solidFill>
+        </p:spPr>
+        <p:style>
+          <a:lnRef idx="2">
+            <a:schemeClr val="accent1">
+              <a:shade val="50000"/>
+            </a:schemeClr>
+          </a:lnRef>
+          <a:fillRef idx="1">
+            <a:schemeClr val="accent1"/>
+          </a:fillRef>
+          <a:effectRef idx="0">
+            <a:schemeClr val="accent1"/>
+          </a:effectRef>
+          <a:fontRef idx="minor">
+            <a:schemeClr val="lt1"/>
+          </a:fontRef>
+        </p:style>
+        <p:txBody>
+          <a:bodyPr rtlCol="0" anchor="ctr"/>
+          <a:lstStyle/>
+          <a:p>
+            <a:pPr algn="ctr"/>
+            <a:endParaRPr lang="en-US"/>
+          </a:p>
+        </p:txBody>
+      </p:sp>
+      <p:sp>
+        <p:nvSpPr>
+          <p:cNvPr id="68" name="Rectangle 67">
+            <a:extLst>
+              <a:ext uri="{FF2B5EF4-FFF2-40B4-BE49-F238E27FC236}">
+                <a16:creationId xmlns:a16="http://schemas.microsoft.com/office/drawing/2014/main" id="{AA258703-C701-EBA3-01F7-B506D037C2FA}"/>
+              </a:ext>
+            </a:extLst>
+          </p:cNvPr>
+          <p:cNvSpPr/>
+          <p:nvPr/>
+        </p:nvSpPr>
+        <p:spPr>
+          <a:xfrm>
+            <a:off x="265414" y="6255096"/>
+            <a:ext cx="1900196" cy="363682"/>
+          </a:xfrm>
+          <a:prstGeom prst="rect">
+            <a:avLst/>
+          </a:prstGeom>
+          <a:solidFill>
+            <a:schemeClr val="tx1">
+              <a:lumMod val="95000"/>
+              <a:lumOff val="5000"/>
+            </a:schemeClr>
+          </a:solidFill>
+        </p:spPr>
+        <p:style>
+          <a:lnRef idx="2">
+            <a:schemeClr val="accent1">
+              <a:shade val="50000"/>
+            </a:schemeClr>
+          </a:lnRef>
+          <a:fillRef idx="1">
+            <a:schemeClr val="accent1"/>
+          </a:fillRef>
+          <a:effectRef idx="0">
+            <a:schemeClr val="accent1"/>
+          </a:effectRef>
+          <a:fontRef idx="minor">
+            <a:schemeClr val="lt1"/>
+          </a:fontRef>
+        </p:style>
+        <p:txBody>
+          <a:bodyPr rtlCol="0" anchor="ctr"/>
+          <a:lstStyle/>
+          <a:p>
+            <a:pPr algn="ctr"/>
+            <a:r>
+              <a:rPr lang="en-US" dirty="0"/>
+              <a:t>Python</a:t>
+            </a:r>
+          </a:p>
+        </p:txBody>
+      </p:sp>
+      <p:sp>
+        <p:nvSpPr>
+          <p:cNvPr id="69" name="Rectangle: Rounded Corners 68">
+            <a:extLst>
+              <a:ext uri="{FF2B5EF4-FFF2-40B4-BE49-F238E27FC236}">
+                <a16:creationId xmlns:a16="http://schemas.microsoft.com/office/drawing/2014/main" id="{A5F89669-65D5-20AA-207D-FEDFB3E0F396}"/>
+              </a:ext>
+            </a:extLst>
+          </p:cNvPr>
+          <p:cNvSpPr/>
+          <p:nvPr/>
+        </p:nvSpPr>
+        <p:spPr>
+          <a:xfrm>
+            <a:off x="2909814" y="6145021"/>
+            <a:ext cx="1236617" cy="462616"/>
+          </a:xfrm>
+          <a:prstGeom prst="roundRect">
+            <a:avLst/>
+          </a:prstGeom>
+          <a:solidFill>
+            <a:srgbClr val="7030A0"/>
+          </a:solidFill>
+        </p:spPr>
+        <p:style>
+          <a:lnRef idx="2">
+            <a:schemeClr val="accent1">
+              <a:shade val="50000"/>
+            </a:schemeClr>
+          </a:lnRef>
+          <a:fillRef idx="1">
+            <a:schemeClr val="accent1"/>
+          </a:fillRef>
+          <a:effectRef idx="0">
+            <a:schemeClr val="accent1"/>
+          </a:effectRef>
+          <a:fontRef idx="minor">
+            <a:schemeClr val="lt1"/>
+          </a:fontRef>
+        </p:style>
+        <p:txBody>
+          <a:bodyPr rtlCol="0" anchor="ctr"/>
+          <a:lstStyle/>
+          <a:p>
+            <a:pPr algn="ctr"/>
+            <a:r>
+              <a:rPr lang="en-US" sz="1200" dirty="0"/>
+              <a:t>GitHub</a:t>
+            </a:r>
+          </a:p>
+        </p:txBody>
+      </p:sp>
+      <p:sp>
+        <p:nvSpPr>
+          <p:cNvPr id="71" name="Rectangle: Rounded Corners 70">
+            <a:extLst>
+              <a:ext uri="{FF2B5EF4-FFF2-40B4-BE49-F238E27FC236}">
+                <a16:creationId xmlns:a16="http://schemas.microsoft.com/office/drawing/2014/main" id="{17D49F7F-F200-5947-E641-7991AF1A5DE0}"/>
+              </a:ext>
+            </a:extLst>
+          </p:cNvPr>
+          <p:cNvSpPr/>
+          <p:nvPr/>
+        </p:nvSpPr>
+        <p:spPr>
+          <a:xfrm>
+            <a:off x="4692074" y="6127775"/>
+            <a:ext cx="910042" cy="569842"/>
+          </a:xfrm>
+          <a:prstGeom prst="roundRect">
+            <a:avLst/>
+          </a:prstGeom>
+          <a:solidFill>
+            <a:srgbClr val="C00000"/>
+          </a:solidFill>
+        </p:spPr>
+        <p:style>
+          <a:lnRef idx="2">
+            <a:schemeClr val="accent1">
+              <a:shade val="50000"/>
+            </a:schemeClr>
+          </a:lnRef>
+          <a:fillRef idx="1">
+            <a:schemeClr val="accent1"/>
+          </a:fillRef>
+          <a:effectRef idx="0">
+            <a:schemeClr val="accent1"/>
+          </a:effectRef>
+          <a:fontRef idx="minor">
+            <a:schemeClr val="lt1"/>
+          </a:fontRef>
+        </p:style>
+        <p:txBody>
+          <a:bodyPr rtlCol="0" anchor="ctr"/>
+          <a:lstStyle/>
+          <a:p>
+            <a:pPr algn="ctr"/>
+            <a:r>
+              <a:rPr lang="en-US" sz="1200" dirty="0"/>
+              <a:t>Convert to Python file</a:t>
+            </a:r>
+          </a:p>
+        </p:txBody>
+      </p:sp>
+      <p:sp>
+        <p:nvSpPr>
+          <p:cNvPr id="72" name="Arrow: Down 71">
+            <a:extLst>
+              <a:ext uri="{FF2B5EF4-FFF2-40B4-BE49-F238E27FC236}">
+                <a16:creationId xmlns:a16="http://schemas.microsoft.com/office/drawing/2014/main" id="{10E6C62B-85C3-DF88-B706-7C082E51CFDF}"/>
+              </a:ext>
+            </a:extLst>
+          </p:cNvPr>
+          <p:cNvSpPr/>
+          <p:nvPr/>
+        </p:nvSpPr>
+        <p:spPr>
+          <a:xfrm rot="5400000">
+            <a:off x="4312444" y="6196905"/>
+            <a:ext cx="265610" cy="342505"/>
+          </a:xfrm>
+          <a:prstGeom prst="downArrow">
+            <a:avLst/>
+          </a:prstGeom>
+        </p:spPr>
+        <p:style>
+          <a:lnRef idx="2">
+            <a:schemeClr val="accent1">
+              <a:shade val="50000"/>
+            </a:schemeClr>
+          </a:lnRef>
+          <a:fillRef idx="1">
+            <a:schemeClr val="accent1"/>
+          </a:fillRef>
+          <a:effectRef idx="0">
+            <a:schemeClr val="accent1"/>
+          </a:effectRef>
+          <a:fontRef idx="minor">
+            <a:schemeClr val="lt1"/>
+          </a:fontRef>
+        </p:style>
+        <p:txBody>
+          <a:bodyPr rtlCol="0" anchor="ctr"/>
+          <a:lstStyle/>
+          <a:p>
+            <a:pPr algn="ctr"/>
+            <a:endParaRPr lang="en-US"/>
+          </a:p>
+        </p:txBody>
+      </p:sp>
+      <p:sp>
+        <p:nvSpPr>
+          <p:cNvPr id="73" name="Arrow: Down 72">
+            <a:extLst>
+              <a:ext uri="{FF2B5EF4-FFF2-40B4-BE49-F238E27FC236}">
+                <a16:creationId xmlns:a16="http://schemas.microsoft.com/office/drawing/2014/main" id="{C7985295-4F1A-1D7C-54D5-F18D8219164D}"/>
+              </a:ext>
+            </a:extLst>
+          </p:cNvPr>
+          <p:cNvSpPr/>
+          <p:nvPr/>
+        </p:nvSpPr>
+        <p:spPr>
+          <a:xfrm rot="5400000">
+            <a:off x="5720350" y="6191566"/>
+            <a:ext cx="265610" cy="342505"/>
+          </a:xfrm>
+          <a:prstGeom prst="downArrow">
+            <a:avLst/>
+          </a:prstGeom>
         </p:spPr>
         <p:style>
           <a:lnRef idx="2">
@@ -6330,4 +6825,299 @@
     </a:ext>
   </a:extLst>
 </a:theme>
+</file>
+
+<file path=ppt/theme/theme2.xml><?xml version="1.0" encoding="utf-8"?>
+<a:theme xmlns:a="http://schemas.openxmlformats.org/drawingml/2006/main" name="Office Theme">
+  <a:themeElements>
+    <a:clrScheme name="Office">
+      <a:dk1>
+        <a:sysClr val="windowText" lastClr="000000"/>
+      </a:dk1>
+      <a:lt1>
+        <a:sysClr val="window" lastClr="FFFFFF"/>
+      </a:lt1>
+      <a:dk2>
+        <a:srgbClr val="44546A"/>
+      </a:dk2>
+      <a:lt2>
+        <a:srgbClr val="E7E6E6"/>
+      </a:lt2>
+      <a:accent1>
+        <a:srgbClr val="4472C4"/>
+      </a:accent1>
+      <a:accent2>
+        <a:srgbClr val="ED7D31"/>
+      </a:accent2>
+      <a:accent3>
+        <a:srgbClr val="A5A5A5"/>
+      </a:accent3>
+      <a:accent4>
+        <a:srgbClr val="FFC000"/>
+      </a:accent4>
+      <a:accent5>
+        <a:srgbClr val="5B9BD5"/>
+      </a:accent5>
+      <a:accent6>
+        <a:srgbClr val="70AD47"/>
+      </a:accent6>
+      <a:hlink>
+        <a:srgbClr val="0563C1"/>
+      </a:hlink>
+      <a:folHlink>
+        <a:srgbClr val="954F72"/>
+      </a:folHlink>
+    </a:clrScheme>
+    <a:fontScheme name="Office">
+      <a:majorFont>
+        <a:latin typeface="Calibri Light" panose="020F0302020204030204"/>
+        <a:ea typeface=""/>
+        <a:cs typeface=""/>
+        <a:font script="Jpan" typeface="游ゴシック Light"/>
+        <a:font script="Hang" typeface="맑은 고딕"/>
+        <a:font script="Hans" typeface="等线 Light"/>
+        <a:font script="Hant" typeface="新細明體"/>
+        <a:font script="Arab" typeface="Times New Roman"/>
+        <a:font script="Hebr" typeface="Times New Roman"/>
+        <a:font script="Thai" typeface="Angsana New"/>
+        <a:font script="Ethi" typeface="Nyala"/>
+        <a:font script="Beng" typeface="Vrinda"/>
+        <a:font script="Gujr" typeface="Shruti"/>
+        <a:font script="Khmr" typeface="MoolBoran"/>
+        <a:font script="Knda" typeface="Tunga"/>
+        <a:font script="Guru" typeface="Raavi"/>
+        <a:font script="Cans" typeface="Euphemia"/>
+        <a:font script="Cher" typeface="Plantagenet Cherokee"/>
+        <a:font script="Yiii" typeface="Microsoft Yi Baiti"/>
+        <a:font script="Tibt" typeface="Microsoft Himalaya"/>
+        <a:font script="Thaa" typeface="MV Boli"/>
+        <a:font script="Deva" typeface="Mangal"/>
+        <a:font script="Telu" typeface="Gautami"/>
+        <a:font script="Taml" typeface="Latha"/>
+        <a:font script="Syrc" typeface="Estrangelo Edessa"/>
+        <a:font script="Orya" typeface="Kalinga"/>
+        <a:font script="Mlym" typeface="Kartika"/>
+        <a:font script="Laoo" typeface="DokChampa"/>
+        <a:font script="Sinh" typeface="Iskoola Pota"/>
+        <a:font script="Mong" typeface="Mongolian Baiti"/>
+        <a:font script="Viet" typeface="Times New Roman"/>
+        <a:font script="Uigh" typeface="Microsoft Uighur"/>
+        <a:font script="Geor" typeface="Sylfaen"/>
+        <a:font script="Armn" typeface="Arial"/>
+        <a:font script="Bugi" typeface="Leelawadee UI"/>
+        <a:font script="Bopo" typeface="Microsoft JhengHei"/>
+        <a:font script="Java" typeface="Javanese Text"/>
+        <a:font script="Lisu" typeface="Segoe UI"/>
+        <a:font script="Mymr" typeface="Myanmar Text"/>
+        <a:font script="Nkoo" typeface="Ebrima"/>
+        <a:font script="Olck" typeface="Nirmala UI"/>
+        <a:font script="Osma" typeface="Ebrima"/>
+        <a:font script="Phag" typeface="Phagspa"/>
+        <a:font script="Syrn" typeface="Estrangelo Edessa"/>
+        <a:font script="Syrj" typeface="Estrangelo Edessa"/>
+        <a:font script="Syre" typeface="Estrangelo Edessa"/>
+        <a:font script="Sora" typeface="Nirmala UI"/>
+        <a:font script="Tale" typeface="Microsoft Tai Le"/>
+        <a:font script="Talu" typeface="Microsoft New Tai Lue"/>
+        <a:font script="Tfng" typeface="Ebrima"/>
+      </a:majorFont>
+      <a:minorFont>
+        <a:latin typeface="Calibri" panose="020F0502020204030204"/>
+        <a:ea typeface=""/>
+        <a:cs typeface=""/>
+        <a:font script="Jpan" typeface="游ゴシック"/>
+        <a:font script="Hang" typeface="맑은 고딕"/>
+        <a:font script="Hans" typeface="等线"/>
+        <a:font script="Hant" typeface="新細明體"/>
+        <a:font script="Arab" typeface="Arial"/>
+        <a:font script="Hebr" typeface="Arial"/>
+        <a:font script="Thai" typeface="Cordia New"/>
+        <a:font script="Ethi" typeface="Nyala"/>
+        <a:font script="Beng" typeface="Vrinda"/>
+        <a:font script="Gujr" typeface="Shruti"/>
+        <a:font script="Khmr" typeface="DaunPenh"/>
+        <a:font script="Knda" typeface="Tunga"/>
+        <a:font script="Guru" typeface="Raavi"/>
+        <a:font script="Cans" typeface="Euphemia"/>
+        <a:font script="Cher" typeface="Plantagenet Cherokee"/>
+        <a:font script="Yiii" typeface="Microsoft Yi Baiti"/>
+        <a:font script="Tibt" typeface="Microsoft Himalaya"/>
+        <a:font script="Thaa" typeface="MV Boli"/>
+        <a:font script="Deva" typeface="Mangal"/>
+        <a:font script="Telu" typeface="Gautami"/>
+        <a:font script="Taml" typeface="Latha"/>
+        <a:font script="Syrc" typeface="Estrangelo Edessa"/>
+        <a:font script="Orya" typeface="Kalinga"/>
+        <a:font script="Mlym" typeface="Kartika"/>
+        <a:font script="Laoo" typeface="DokChampa"/>
+        <a:font script="Sinh" typeface="Iskoola Pota"/>
+        <a:font script="Mong" typeface="Mongolian Baiti"/>
+        <a:font script="Viet" typeface="Arial"/>
+        <a:font script="Uigh" typeface="Microsoft Uighur"/>
+        <a:font script="Geor" typeface="Sylfaen"/>
+        <a:font script="Armn" typeface="Arial"/>
+        <a:font script="Bugi" typeface="Leelawadee UI"/>
+        <a:font script="Bopo" typeface="Microsoft JhengHei"/>
+        <a:font script="Java" typeface="Javanese Text"/>
+        <a:font script="Lisu" typeface="Segoe UI"/>
+        <a:font script="Mymr" typeface="Myanmar Text"/>
+        <a:font script="Nkoo" typeface="Ebrima"/>
+        <a:font script="Olck" typeface="Nirmala UI"/>
+        <a:font script="Osma" typeface="Ebrima"/>
+        <a:font script="Phag" typeface="Phagspa"/>
+        <a:font script="Syrn" typeface="Estrangelo Edessa"/>
+        <a:font script="Syrj" typeface="Estrangelo Edessa"/>
+        <a:font script="Syre" typeface="Estrangelo Edessa"/>
+        <a:font script="Sora" typeface="Nirmala UI"/>
+        <a:font script="Tale" typeface="Microsoft Tai Le"/>
+        <a:font script="Talu" typeface="Microsoft New Tai Lue"/>
+        <a:font script="Tfng" typeface="Ebrima"/>
+      </a:minorFont>
+    </a:fontScheme>
+    <a:fmtScheme name="Office">
+      <a:fillStyleLst>
+        <a:solidFill>
+          <a:schemeClr val="phClr"/>
+        </a:solidFill>
+        <a:gradFill rotWithShape="1">
+          <a:gsLst>
+            <a:gs pos="0">
+              <a:schemeClr val="phClr">
+                <a:lumMod val="110000"/>
+                <a:satMod val="105000"/>
+                <a:tint val="67000"/>
+              </a:schemeClr>
+            </a:gs>
+            <a:gs pos="50000">
+              <a:schemeClr val="phClr">
+                <a:lumMod val="105000"/>
+                <a:satMod val="103000"/>
+                <a:tint val="73000"/>
+              </a:schemeClr>
+            </a:gs>
+            <a:gs pos="100000">
+              <a:schemeClr val="phClr">
+                <a:lumMod val="105000"/>
+                <a:satMod val="109000"/>
+                <a:tint val="81000"/>
+              </a:schemeClr>
+            </a:gs>
+          </a:gsLst>
+          <a:lin ang="5400000" scaled="0"/>
+        </a:gradFill>
+        <a:gradFill rotWithShape="1">
+          <a:gsLst>
+            <a:gs pos="0">
+              <a:schemeClr val="phClr">
+                <a:satMod val="103000"/>
+                <a:lumMod val="102000"/>
+                <a:tint val="94000"/>
+              </a:schemeClr>
+            </a:gs>
+            <a:gs pos="50000">
+              <a:schemeClr val="phClr">
+                <a:satMod val="110000"/>
+                <a:lumMod val="100000"/>
+                <a:shade val="100000"/>
+              </a:schemeClr>
+            </a:gs>
+            <a:gs pos="100000">
+              <a:schemeClr val="phClr">
+                <a:lumMod val="99000"/>
+                <a:satMod val="120000"/>
+                <a:shade val="78000"/>
+              </a:schemeClr>
+            </a:gs>
+          </a:gsLst>
+          <a:lin ang="5400000" scaled="0"/>
+        </a:gradFill>
+      </a:fillStyleLst>
+      <a:lnStyleLst>
+        <a:ln w="6350" cap="flat" cmpd="sng" algn="ctr">
+          <a:solidFill>
+            <a:schemeClr val="phClr"/>
+          </a:solidFill>
+          <a:prstDash val="solid"/>
+          <a:miter lim="800000"/>
+        </a:ln>
+        <a:ln w="12700" cap="flat" cmpd="sng" algn="ctr">
+          <a:solidFill>
+            <a:schemeClr val="phClr"/>
+          </a:solidFill>
+          <a:prstDash val="solid"/>
+          <a:miter lim="800000"/>
+        </a:ln>
+        <a:ln w="19050" cap="flat" cmpd="sng" algn="ctr">
+          <a:solidFill>
+            <a:schemeClr val="phClr"/>
+          </a:solidFill>
+          <a:prstDash val="solid"/>
+          <a:miter lim="800000"/>
+        </a:ln>
+      </a:lnStyleLst>
+      <a:effectStyleLst>
+        <a:effectStyle>
+          <a:effectLst/>
+        </a:effectStyle>
+        <a:effectStyle>
+          <a:effectLst/>
+        </a:effectStyle>
+        <a:effectStyle>
+          <a:effectLst>
+            <a:outerShdw blurRad="57150" dist="19050" dir="5400000" algn="ctr" rotWithShape="0">
+              <a:srgbClr val="000000">
+                <a:alpha val="63000"/>
+              </a:srgbClr>
+            </a:outerShdw>
+          </a:effectLst>
+        </a:effectStyle>
+      </a:effectStyleLst>
+      <a:bgFillStyleLst>
+        <a:solidFill>
+          <a:schemeClr val="phClr"/>
+        </a:solidFill>
+        <a:solidFill>
+          <a:schemeClr val="phClr">
+            <a:tint val="95000"/>
+            <a:satMod val="170000"/>
+          </a:schemeClr>
+        </a:solidFill>
+        <a:gradFill rotWithShape="1">
+          <a:gsLst>
+            <a:gs pos="0">
+              <a:schemeClr val="phClr">
+                <a:tint val="93000"/>
+                <a:satMod val="150000"/>
+                <a:shade val="98000"/>
+                <a:lumMod val="102000"/>
+              </a:schemeClr>
+            </a:gs>
+            <a:gs pos="50000">
+              <a:schemeClr val="phClr">
+                <a:tint val="98000"/>
+                <a:satMod val="130000"/>
+                <a:shade val="90000"/>
+                <a:lumMod val="103000"/>
+              </a:schemeClr>
+            </a:gs>
+            <a:gs pos="100000">
+              <a:schemeClr val="phClr">
+                <a:shade val="63000"/>
+                <a:satMod val="120000"/>
+              </a:schemeClr>
+            </a:gs>
+          </a:gsLst>
+          <a:lin ang="5400000" scaled="0"/>
+        </a:gradFill>
+      </a:bgFillStyleLst>
+    </a:fmtScheme>
+  </a:themeElements>
+  <a:objectDefaults/>
+  <a:extraClrSchemeLst/>
+  <a:extLst>
+    <a:ext uri="{05A4C25C-085E-4340-85A3-A5531E510DB2}">
+      <thm15:themeFamily xmlns:thm15="http://schemas.microsoft.com/office/thememl/2012/main" name="Office Theme" id="{62F939B6-93AF-4DB8-9C6B-D6C7DFDC589F}" vid="{4A3C46E8-61CC-4603-A589-7422A47A8E4A}"/>
+    </a:ext>
+  </a:extLst>
+</a:theme>
 </file>
</xml_diff>

<commit_message>
Add System design in README.md
</commit_message>
<xml_diff>
--- a/Overall_Arch.pptx
+++ b/Overall_Arch.pptx
@@ -108,6 +108,14 @@
       </a:defRPr>
     </a:lvl9pPr>
   </p:defaultTextStyle>
+  <p:extLst>
+    <p:ext uri="{EFAFB233-063F-42B5-8137-9DF3F51BA10A}">
+      <p15:sldGuideLst xmlns:p15="http://schemas.microsoft.com/office/powerpoint/2012/main"/>
+    </p:ext>
+    <p:ext uri="{2D200454-40CA-4A62-9FC3-DE9A4176ACB9}">
+      <p15:notesGuideLst xmlns:p15="http://schemas.microsoft.com/office/powerpoint/2012/main"/>
+    </p:ext>
+  </p:extLst>
 </p:presentation>
 </file>
 
@@ -205,7 +213,7 @@
           <a:p>
             <a:fld id="{D1D65448-90E9-4537-896B-E7B509937D81}" type="datetimeFigureOut">
               <a:rPr lang="en-US" smtClean="0"/>
-              <a:t>3/18/2023</a:t>
+              <a:t>3/19/2023</a:t>
             </a:fld>
             <a:endParaRPr lang="en-US"/>
           </a:p>
@@ -447,7 +455,7 @@
           <a:p>
             <a:fld id="{3F3A774B-69BF-4BA1-A1A4-BE2DC5A22C60}" type="datetimeFigureOut">
               <a:rPr lang="en-US" smtClean="0"/>
-              <a:t>3/18/2023</a:t>
+              <a:t>3/19/2023</a:t>
             </a:fld>
             <a:endParaRPr lang="en-US"/>
           </a:p>
@@ -645,7 +653,7 @@
           <a:p>
             <a:fld id="{3F3A774B-69BF-4BA1-A1A4-BE2DC5A22C60}" type="datetimeFigureOut">
               <a:rPr lang="en-US" smtClean="0"/>
-              <a:t>3/18/2023</a:t>
+              <a:t>3/19/2023</a:t>
             </a:fld>
             <a:endParaRPr lang="en-US"/>
           </a:p>
@@ -853,7 +861,7 @@
           <a:p>
             <a:fld id="{3F3A774B-69BF-4BA1-A1A4-BE2DC5A22C60}" type="datetimeFigureOut">
               <a:rPr lang="en-US" smtClean="0"/>
-              <a:t>3/18/2023</a:t>
+              <a:t>3/19/2023</a:t>
             </a:fld>
             <a:endParaRPr lang="en-US"/>
           </a:p>
@@ -1051,7 +1059,7 @@
           <a:p>
             <a:fld id="{3F3A774B-69BF-4BA1-A1A4-BE2DC5A22C60}" type="datetimeFigureOut">
               <a:rPr lang="en-US" smtClean="0"/>
-              <a:t>3/18/2023</a:t>
+              <a:t>3/19/2023</a:t>
             </a:fld>
             <a:endParaRPr lang="en-US"/>
           </a:p>
@@ -1326,7 +1334,7 @@
           <a:p>
             <a:fld id="{3F3A774B-69BF-4BA1-A1A4-BE2DC5A22C60}" type="datetimeFigureOut">
               <a:rPr lang="en-US" smtClean="0"/>
-              <a:t>3/18/2023</a:t>
+              <a:t>3/19/2023</a:t>
             </a:fld>
             <a:endParaRPr lang="en-US"/>
           </a:p>
@@ -1591,7 +1599,7 @@
           <a:p>
             <a:fld id="{3F3A774B-69BF-4BA1-A1A4-BE2DC5A22C60}" type="datetimeFigureOut">
               <a:rPr lang="en-US" smtClean="0"/>
-              <a:t>3/18/2023</a:t>
+              <a:t>3/19/2023</a:t>
             </a:fld>
             <a:endParaRPr lang="en-US"/>
           </a:p>
@@ -2003,7 +2011,7 @@
           <a:p>
             <a:fld id="{3F3A774B-69BF-4BA1-A1A4-BE2DC5A22C60}" type="datetimeFigureOut">
               <a:rPr lang="en-US" smtClean="0"/>
-              <a:t>3/18/2023</a:t>
+              <a:t>3/19/2023</a:t>
             </a:fld>
             <a:endParaRPr lang="en-US"/>
           </a:p>
@@ -2144,7 +2152,7 @@
           <a:p>
             <a:fld id="{3F3A774B-69BF-4BA1-A1A4-BE2DC5A22C60}" type="datetimeFigureOut">
               <a:rPr lang="en-US" smtClean="0"/>
-              <a:t>3/18/2023</a:t>
+              <a:t>3/19/2023</a:t>
             </a:fld>
             <a:endParaRPr lang="en-US"/>
           </a:p>
@@ -2257,7 +2265,7 @@
           <a:p>
             <a:fld id="{3F3A774B-69BF-4BA1-A1A4-BE2DC5A22C60}" type="datetimeFigureOut">
               <a:rPr lang="en-US" smtClean="0"/>
-              <a:t>3/18/2023</a:t>
+              <a:t>3/19/2023</a:t>
             </a:fld>
             <a:endParaRPr lang="en-US"/>
           </a:p>
@@ -2568,7 +2576,7 @@
           <a:p>
             <a:fld id="{3F3A774B-69BF-4BA1-A1A4-BE2DC5A22C60}" type="datetimeFigureOut">
               <a:rPr lang="en-US" smtClean="0"/>
-              <a:t>3/18/2023</a:t>
+              <a:t>3/19/2023</a:t>
             </a:fld>
             <a:endParaRPr lang="en-US"/>
           </a:p>
@@ -2856,7 +2864,7 @@
           <a:p>
             <a:fld id="{3F3A774B-69BF-4BA1-A1A4-BE2DC5A22C60}" type="datetimeFigureOut">
               <a:rPr lang="en-US" smtClean="0"/>
-              <a:t>3/18/2023</a:t>
+              <a:t>3/19/2023</a:t>
             </a:fld>
             <a:endParaRPr lang="en-US"/>
           </a:p>
@@ -3097,7 +3105,7 @@
           <a:p>
             <a:fld id="{3F3A774B-69BF-4BA1-A1A4-BE2DC5A22C60}" type="datetimeFigureOut">
               <a:rPr lang="en-US" smtClean="0"/>
-              <a:t>3/18/2023</a:t>
+              <a:t>3/19/2023</a:t>
             </a:fld>
             <a:endParaRPr lang="en-US"/>
           </a:p>
@@ -6728,6 +6736,56 @@
               <a:rPr lang="en-US" sz="1200" dirty="0"/>
               <a:t>)</a:t>
             </a:r>
+          </a:p>
+        </p:txBody>
+      </p:sp>
+      <p:sp>
+        <p:nvSpPr>
+          <p:cNvPr id="2" name="Arrow: Bent 1">
+            <a:extLst>
+              <a:ext uri="{FF2B5EF4-FFF2-40B4-BE49-F238E27FC236}">
+                <a16:creationId xmlns:a16="http://schemas.microsoft.com/office/drawing/2014/main" id="{C1CA32A3-95EA-70A6-7545-08FDD601467E}"/>
+              </a:ext>
+            </a:extLst>
+          </p:cNvPr>
+          <p:cNvSpPr/>
+          <p:nvPr/>
+        </p:nvSpPr>
+        <p:spPr>
+          <a:xfrm>
+            <a:off x="9135453" y="3551109"/>
+            <a:ext cx="505627" cy="133667"/>
+          </a:xfrm>
+          <a:prstGeom prst="bentArrow">
+            <a:avLst/>
+          </a:prstGeom>
+        </p:spPr>
+        <p:style>
+          <a:lnRef idx="2">
+            <a:schemeClr val="accent1">
+              <a:shade val="50000"/>
+            </a:schemeClr>
+          </a:lnRef>
+          <a:fillRef idx="1">
+            <a:schemeClr val="accent1"/>
+          </a:fillRef>
+          <a:effectRef idx="0">
+            <a:schemeClr val="accent1"/>
+          </a:effectRef>
+          <a:fontRef idx="minor">
+            <a:schemeClr val="lt1"/>
+          </a:fontRef>
+        </p:style>
+        <p:txBody>
+          <a:bodyPr rtlCol="0" anchor="ctr"/>
+          <a:lstStyle/>
+          <a:p>
+            <a:pPr algn="ctr"/>
+            <a:endParaRPr lang="en-US">
+              <a:solidFill>
+                <a:schemeClr val="tx1"/>
+              </a:solidFill>
+            </a:endParaRPr>
           </a:p>
         </p:txBody>
       </p:sp>

</xml_diff>